<commit_message>
bkash.pptx superviser and group no added
</commit_message>
<xml_diff>
--- a/Bkash.pptx
+++ b/Bkash.pptx
@@ -14,6 +14,7 @@
     <p:sldId id="261" r:id="rId8"/>
     <p:sldId id="262" r:id="rId9"/>
     <p:sldId id="266" r:id="rId10"/>
+    <p:sldId id="268" r:id="rId11"/>
   </p:sldIdLst>
   <p:sldSz cx="12192000" cy="6858000"/>
   <p:notesSz cx="6858000" cy="9144000"/>
@@ -126,6 +127,7 @@
             <p14:sldId id="261"/>
             <p14:sldId id="262"/>
             <p14:sldId id="266"/>
+            <p14:sldId id="268"/>
           </p14:sldIdLst>
         </p14:section>
         <p14:section name="Untitled Section" id="{7C254334-82E0-41CA-B82E-22CAD4DF07D7}">
@@ -336,7 +338,7 @@
           <a:p>
             <a:fld id="{ECD19FB2-3AAB-4D03-B13A-2960828C78E3}" type="datetimeFigureOut">
               <a:rPr lang="en-US" dirty="0"/>
-              <a:t>29-Sep-20</a:t>
+              <a:t>9/29/2020</a:t>
             </a:fld>
             <a:endParaRPr lang="en-US" dirty="0"/>
           </a:p>
@@ -613,7 +615,7 @@
           <a:p>
             <a:fld id="{1B80C674-7DFC-42FE-B9CD-82963CDB1557}" type="datetimeFigureOut">
               <a:rPr lang="en-US" dirty="0"/>
-              <a:t>29-Sep-20</a:t>
+              <a:t>9/29/2020</a:t>
             </a:fld>
             <a:endParaRPr lang="en-US" dirty="0"/>
           </a:p>
@@ -800,7 +802,7 @@
           <a:p>
             <a:fld id="{2076456F-F47D-4F25-8053-2A695DA0CA7D}" type="datetimeFigureOut">
               <a:rPr lang="en-US" dirty="0"/>
-              <a:t>29-Sep-20</a:t>
+              <a:t>9/29/2020</a:t>
             </a:fld>
             <a:endParaRPr lang="en-US" dirty="0"/>
           </a:p>
@@ -1056,7 +1058,7 @@
           <a:p>
             <a:fld id="{5D6C7379-69CC-4837-9905-BEBA22830C8A}" type="datetimeFigureOut">
               <a:rPr lang="en-US" dirty="0"/>
-              <a:t>29-Sep-20</a:t>
+              <a:t>9/29/2020</a:t>
             </a:fld>
             <a:endParaRPr lang="en-US" dirty="0"/>
           </a:p>
@@ -1477,7 +1479,7 @@
           <a:p>
             <a:fld id="{49EB8B7E-8AEE-4F10-BFEE-C999AD004D36}" type="datetimeFigureOut">
               <a:rPr lang="en-US" dirty="0"/>
-              <a:t>29-Sep-20</a:t>
+              <a:t>9/29/2020</a:t>
             </a:fld>
             <a:endParaRPr lang="en-US" dirty="0"/>
           </a:p>
@@ -2018,7 +2020,7 @@
           <a:p>
             <a:fld id="{8668F3F9-58BC-440B-B37B-805B9055EF92}" type="datetimeFigureOut">
               <a:rPr lang="en-US" dirty="0"/>
-              <a:t>29-Sep-20</a:t>
+              <a:t>9/29/2020</a:t>
             </a:fld>
             <a:endParaRPr lang="en-US" dirty="0"/>
           </a:p>
@@ -2844,7 +2846,7 @@
           <a:p>
             <a:fld id="{0D5A53AF-48EA-489D-8260-9DCAB666386A}" type="datetimeFigureOut">
               <a:rPr lang="en-US" dirty="0"/>
-              <a:t>29-Sep-20</a:t>
+              <a:t>9/29/2020</a:t>
             </a:fld>
             <a:endParaRPr lang="en-US" dirty="0"/>
           </a:p>
@@ -3009,7 +3011,7 @@
           <a:p>
             <a:fld id="{0DED02AE-B9A4-47BD-AF8E-97E16144138B}" type="datetimeFigureOut">
               <a:rPr lang="en-US" dirty="0"/>
-              <a:t>29-Sep-20</a:t>
+              <a:t>9/29/2020</a:t>
             </a:fld>
             <a:endParaRPr lang="en-US" dirty="0"/>
           </a:p>
@@ -3184,7 +3186,7 @@
           <a:p>
             <a:fld id="{CF0FD78B-DB02-4362-BCDC-98A55456977C}" type="datetimeFigureOut">
               <a:rPr lang="en-US" dirty="0"/>
-              <a:t>29-Sep-20</a:t>
+              <a:t>9/29/2020</a:t>
             </a:fld>
             <a:endParaRPr lang="en-US" dirty="0"/>
           </a:p>
@@ -3349,7 +3351,7 @@
           <a:p>
             <a:fld id="{99916976-5D93-46E4-A98A-FAD63E4D0EA8}" type="datetimeFigureOut">
               <a:rPr lang="en-US" dirty="0"/>
-              <a:t>29-Sep-20</a:t>
+              <a:t>9/29/2020</a:t>
             </a:fld>
             <a:endParaRPr lang="en-US" dirty="0"/>
           </a:p>
@@ -3601,7 +3603,7 @@
           <a:p>
             <a:fld id="{0F39F4F5-F4D2-4D2A-AB60-88D37ADCB869}" type="datetimeFigureOut">
               <a:rPr lang="en-US" dirty="0"/>
-              <a:t>29-Sep-20</a:t>
+              <a:t>9/29/2020</a:t>
             </a:fld>
             <a:endParaRPr lang="en-US" dirty="0"/>
           </a:p>
@@ -3828,7 +3830,7 @@
           <a:p>
             <a:fld id="{D23BC6CE-6D1E-47E5-8859-F31AC5380EB2}" type="datetimeFigureOut">
               <a:rPr lang="en-US" dirty="0"/>
-              <a:t>29-Sep-20</a:t>
+              <a:t>9/29/2020</a:t>
             </a:fld>
             <a:endParaRPr lang="en-US" dirty="0"/>
           </a:p>
@@ -4216,7 +4218,7 @@
           <a:p>
             <a:fld id="{B1B4E7C4-4DA4-404D-9965-B13F2DD7D8BF}" type="datetimeFigureOut">
               <a:rPr lang="en-US" dirty="0"/>
-              <a:t>29-Sep-20</a:t>
+              <a:t>9/29/2020</a:t>
             </a:fld>
             <a:endParaRPr lang="en-US" dirty="0"/>
           </a:p>
@@ -4329,7 +4331,7 @@
           <a:p>
             <a:fld id="{476FB7AA-4A53-424F-AD41-70827B6504BA}" type="datetimeFigureOut">
               <a:rPr lang="en-US" dirty="0"/>
-              <a:t>29-Sep-20</a:t>
+              <a:t>9/29/2020</a:t>
             </a:fld>
             <a:endParaRPr lang="en-US" dirty="0"/>
           </a:p>
@@ -4419,7 +4421,7 @@
           <a:p>
             <a:fld id="{E7884882-FB12-4BC8-9960-9AD8104D7FAE}" type="datetimeFigureOut">
               <a:rPr lang="en-US" dirty="0"/>
-              <a:t>29-Sep-20</a:t>
+              <a:t>9/29/2020</a:t>
             </a:fld>
             <a:endParaRPr lang="en-US" dirty="0"/>
           </a:p>
@@ -4687,7 +4689,7 @@
           <a:p>
             <a:fld id="{F7D1BD23-6E54-4D9D-AD88-A2813C73CC25}" type="datetimeFigureOut">
               <a:rPr lang="en-US" dirty="0"/>
-              <a:t>29-Sep-20</a:t>
+              <a:t>9/29/2020</a:t>
             </a:fld>
             <a:endParaRPr lang="en-US" dirty="0"/>
           </a:p>
@@ -4963,7 +4965,7 @@
           <a:p>
             <a:fld id="{1471A834-4F3C-4AF9-9C74-05EC35A0F292}" type="datetimeFigureOut">
               <a:rPr lang="en-US" dirty="0"/>
-              <a:t>29-Sep-20</a:t>
+              <a:t>9/29/2020</a:t>
             </a:fld>
             <a:endParaRPr lang="en-US" dirty="0"/>
           </a:p>
@@ -5198,7 +5200,7 @@
           <a:p>
             <a:fld id="{51CF1133-3259-4C45-BABA-5B62D9C6F78D}" type="datetimeFigureOut">
               <a:rPr lang="en-US" dirty="0"/>
-              <a:t>29-Sep-20</a:t>
+              <a:t>9/29/2020</a:t>
             </a:fld>
             <a:endParaRPr lang="en-US" dirty="0"/>
           </a:p>
@@ -5780,10 +5782,14 @@
           <a:lstStyle/>
           <a:p>
             <a:r>
-              <a:rPr lang="en-US" smtClean="0"/>
-              <a:t>Bkash </a:t>
-            </a:r>
-            <a:endParaRPr lang="en-US"/>
+              <a:rPr lang="en-US" dirty="0" err="1" smtClean="0"/>
+              <a:t>Bkash</a:t>
+            </a:r>
+            <a:r>
+              <a:rPr lang="en-US" dirty="0" smtClean="0"/>
+              <a:t> </a:t>
+            </a:r>
+            <a:endParaRPr lang="en-US" dirty="0"/>
           </a:p>
         </p:txBody>
       </p:sp>
@@ -5810,17 +5816,26 @@
           <a:lstStyle/>
           <a:p>
             <a:r>
-              <a:rPr lang="en-US" sz="1800" smtClean="0"/>
-              <a:t>Group 6 </a:t>
-            </a:r>
-          </a:p>
-          <a:p>
-            <a:r>
-              <a:rPr lang="en-US" sz="1800" smtClean="0"/>
-              <a:t>Section:B</a:t>
-            </a:r>
-            <a:r>
-              <a:rPr lang="en-US" sz="1800" smtClean="0">
+              <a:rPr lang="en-US" sz="1800" dirty="0" smtClean="0"/>
+              <a:t>Group </a:t>
+            </a:r>
+            <a:r>
+              <a:rPr lang="en-US" sz="1800" b="1" dirty="0" smtClean="0"/>
+              <a:t>14 </a:t>
+            </a:r>
+            <a:endParaRPr lang="en-US" sz="1800" b="1" dirty="0" smtClean="0"/>
+          </a:p>
+          <a:p>
+            <a:r>
+              <a:rPr lang="en-US" sz="1800" dirty="0" smtClean="0"/>
+              <a:t>Section:</a:t>
+            </a:r>
+            <a:r>
+              <a:rPr lang="en-US" sz="1800" b="1" dirty="0" smtClean="0"/>
+              <a:t>B</a:t>
+            </a:r>
+            <a:r>
+              <a:rPr lang="en-US" sz="1800" b="1" dirty="0" smtClean="0">
                 <a:latin typeface="Times New Roman" panose="02020603050405020304" pitchFamily="18" charset="0"/>
                 <a:cs typeface="Times New Roman" panose="02020603050405020304" pitchFamily="18" charset="0"/>
               </a:rPr>
@@ -5829,11 +5844,11 @@
           </a:p>
           <a:p>
             <a:r>
-              <a:rPr lang="en-US" sz="1800" smtClean="0"/>
+              <a:rPr lang="en-US" sz="1800" dirty="0" smtClean="0"/>
               <a:t>Student ID:</a:t>
             </a:r>
             <a:r>
-              <a:rPr lang="en-US" sz="1800" smtClean="0">
+              <a:rPr lang="en-US" sz="1800" b="1" dirty="0" smtClean="0">
                 <a:latin typeface="Times New Roman" panose="02020603050405020304" pitchFamily="18" charset="0"/>
                 <a:cs typeface="Times New Roman" panose="02020603050405020304" pitchFamily="18" charset="0"/>
               </a:rPr>
@@ -5842,16 +5857,40 @@
           </a:p>
           <a:p>
             <a:r>
-              <a:rPr lang="en-US" sz="1800" smtClean="0">
+              <a:rPr lang="en-US" sz="1800" b="1" dirty="0" smtClean="0">
                 <a:latin typeface="Times New Roman" panose="02020603050405020304" pitchFamily="18" charset="0"/>
                 <a:cs typeface="Times New Roman" panose="02020603050405020304" pitchFamily="18" charset="0"/>
               </a:rPr>
               <a:t>1705088</a:t>
             </a:r>
-            <a:endParaRPr lang="en-US" sz="1800">
+            <a:endParaRPr lang="en-US" sz="1800" b="1" dirty="0">
               <a:latin typeface="Times New Roman" panose="02020603050405020304" pitchFamily="18" charset="0"/>
               <a:cs typeface="Times New Roman" panose="02020603050405020304" pitchFamily="18" charset="0"/>
             </a:endParaRPr>
+          </a:p>
+          <a:p>
+            <a:r>
+              <a:rPr lang="en-US" sz="1800" dirty="0" smtClean="0">
+                <a:latin typeface="Times New Roman" panose="02020603050405020304" pitchFamily="18" charset="0"/>
+                <a:cs typeface="Times New Roman" panose="02020603050405020304" pitchFamily="18" charset="0"/>
+              </a:rPr>
+              <a:t>Project Supervisor: </a:t>
+            </a:r>
+            <a:r>
+              <a:rPr lang="en-US" sz="1800" b="1" dirty="0"/>
+              <a:t>T. M. Tariq </a:t>
+            </a:r>
+            <a:r>
+              <a:rPr lang="en-US" sz="1800" b="1" dirty="0" smtClean="0"/>
+              <a:t>Adnan</a:t>
+            </a:r>
+            <a:r>
+              <a:rPr lang="en-US" sz="1800" dirty="0" smtClean="0">
+                <a:latin typeface="Times New Roman" panose="02020603050405020304" pitchFamily="18" charset="0"/>
+                <a:cs typeface="Times New Roman" panose="02020603050405020304" pitchFamily="18" charset="0"/>
+              </a:rPr>
+              <a:t> </a:t>
+            </a:r>
           </a:p>
         </p:txBody>
       </p:sp>
@@ -5859,6 +5898,93 @@
     <p:extLst>
       <p:ext uri="{BB962C8B-B14F-4D97-AF65-F5344CB8AC3E}">
         <p14:creationId xmlns:p14="http://schemas.microsoft.com/office/powerpoint/2010/main" val="782409208"/>
+      </p:ext>
+    </p:extLst>
+  </p:cSld>
+  <p:clrMapOvr>
+    <a:masterClrMapping/>
+  </p:clrMapOvr>
+  <p:timing>
+    <p:tnLst>
+      <p:par>
+        <p:cTn id="1" dur="indefinite" restart="never" nodeType="tmRoot"/>
+      </p:par>
+    </p:tnLst>
+  </p:timing>
+</p:sld>
+</file>
+
+<file path=ppt/slides/slide10.xml><?xml version="1.0" encoding="utf-8"?>
+<p:sld xmlns:a="http://schemas.openxmlformats.org/drawingml/2006/main" xmlns:r="http://schemas.openxmlformats.org/officeDocument/2006/relationships" xmlns:p="http://schemas.openxmlformats.org/presentationml/2006/main">
+  <p:cSld>
+    <p:spTree>
+      <p:nvGrpSpPr>
+        <p:cNvPr id="1" name=""/>
+        <p:cNvGrpSpPr/>
+        <p:nvPr/>
+      </p:nvGrpSpPr>
+      <p:grpSpPr>
+        <a:xfrm>
+          <a:off x="0" y="0"/>
+          <a:ext cx="0" cy="0"/>
+          <a:chOff x="0" y="0"/>
+          <a:chExt cx="0" cy="0"/>
+        </a:xfrm>
+      </p:grpSpPr>
+      <p:sp>
+        <p:nvSpPr>
+          <p:cNvPr id="2" name="Title 1"/>
+          <p:cNvSpPr>
+            <a:spLocks noGrp="1"/>
+          </p:cNvSpPr>
+          <p:nvPr>
+            <p:ph type="title"/>
+          </p:nvPr>
+        </p:nvSpPr>
+        <p:spPr/>
+        <p:txBody>
+          <a:bodyPr/>
+          <a:lstStyle/>
+          <a:p>
+            <a:pPr algn="ctr"/>
+            <a:r>
+              <a:rPr lang="en-US" dirty="0" smtClean="0"/>
+              <a:t>Thanks for listening .</a:t>
+            </a:r>
+            <a:endParaRPr lang="en-US" dirty="0"/>
+          </a:p>
+        </p:txBody>
+      </p:sp>
+      <p:sp>
+        <p:nvSpPr>
+          <p:cNvPr id="3" name="Content Placeholder 2"/>
+          <p:cNvSpPr>
+            <a:spLocks noGrp="1"/>
+          </p:cNvSpPr>
+          <p:nvPr>
+            <p:ph idx="1"/>
+          </p:nvPr>
+        </p:nvSpPr>
+        <p:spPr/>
+        <p:txBody>
+          <a:bodyPr/>
+          <a:lstStyle/>
+          <a:p>
+            <a:pPr marL="0" indent="0" algn="ctr">
+              <a:buNone/>
+            </a:pPr>
+            <a:r>
+              <a:rPr lang="en-US" dirty="0" smtClean="0"/>
+              <a:t>Please give your suggestion to improve the ERD.</a:t>
+            </a:r>
+            <a:endParaRPr lang="en-US" dirty="0"/>
+          </a:p>
+        </p:txBody>
+      </p:sp>
+    </p:spTree>
+    <p:extLst>
+      <p:ext uri="{BB962C8B-B14F-4D97-AF65-F5344CB8AC3E}">
+        <p14:creationId xmlns:p14="http://schemas.microsoft.com/office/powerpoint/2010/main" val="3577427662"/>
       </p:ext>
     </p:extLst>
   </p:cSld>
@@ -7249,13 +7375,8 @@
             </a:pPr>
             <a:r>
               <a:rPr lang="en-US" sz="1600" smtClean="0"/>
-              <a:t>3.</a:t>
-            </a:r>
-            <a:r>
-              <a:rPr lang="en-US" sz="1600" smtClean="0"/>
-              <a:t> History_Type</a:t>
-            </a:r>
-            <a:endParaRPr lang="en-US" sz="1600" smtClean="0"/>
+              <a:t>3. History_Type</a:t>
+            </a:r>
           </a:p>
           <a:p>
             <a:pPr marL="0" indent="0">
@@ -7272,7 +7393,6 @@
               <a:rPr lang="en-US" sz="1600" smtClean="0"/>
               <a:t>.Mobile_Operator</a:t>
             </a:r>
-            <a:endParaRPr lang="en-US" sz="1600" smtClean="0"/>
           </a:p>
           <a:p>
             <a:pPr marL="0" indent="0">
@@ -7289,7 +7409,6 @@
               <a:rPr lang="en-US" sz="1600" smtClean="0"/>
               <a:t>.Utility_Service</a:t>
             </a:r>
-            <a:endParaRPr lang="en-US" sz="1600" smtClean="0"/>
           </a:p>
           <a:p>
             <a:pPr marL="0" indent="0">
@@ -7306,7 +7425,6 @@
               <a:rPr lang="en-US" sz="1600" smtClean="0"/>
               <a:t>.Merchants</a:t>
             </a:r>
-            <a:endParaRPr lang="en-US" sz="1600" smtClean="0"/>
           </a:p>
           <a:p>
             <a:pPr marL="0" indent="0">
@@ -7323,7 +7441,6 @@
               <a:rPr lang="en-US" sz="1600" smtClean="0"/>
               <a:t>.Offers</a:t>
             </a:r>
-            <a:endParaRPr lang="en-US" sz="1600" smtClean="0"/>
           </a:p>
           <a:p>
             <a:pPr marL="0" indent="0">
@@ -7337,11 +7454,7 @@
             </a:pPr>
             <a:r>
               <a:rPr lang="en-US" sz="1600" smtClean="0"/>
-              <a:t>There are </a:t>
-            </a:r>
-            <a:r>
-              <a:rPr lang="en-US" sz="1600" smtClean="0"/>
-              <a:t> </a:t>
+              <a:t>There are  </a:t>
             </a:r>
             <a:r>
               <a:rPr lang="en-US" sz="1600" smtClean="0">
@@ -7352,11 +7465,7 @@
             </a:r>
             <a:r>
               <a:rPr lang="en-US" sz="1600" smtClean="0"/>
-              <a:t> </a:t>
-            </a:r>
-            <a:r>
-              <a:rPr lang="en-US" sz="1600" smtClean="0"/>
-              <a:t>different modules:</a:t>
+              <a:t> different modules:</a:t>
             </a:r>
           </a:p>
           <a:p>

</xml_diff>